<commit_message>
Updated Drawing and script:proofed .tex
Updated the robot drawing to 4 wheel and added script draft
</commit_message>
<xml_diff>
--- a/docs/update/ProjUpdate.pptx
+++ b/docs/update/ProjUpdate.pptx
@@ -496,7 +496,7 @@
       </p:grpSpPr>
       <p:sp>
         <p:nvSpPr>
-          <p:cNvPr id="108" name="PlaceHolder 1"/>
+          <p:cNvPr id="2" name="Slide Image Placeholder 1"/>
           <p:cNvSpPr>
             <a:spLocks noGrp="1" noRot="1" noChangeAspect="1"/>
           </p:cNvSpPr>
@@ -506,55 +506,36 @@
         </p:nvSpPr>
         <p:spPr>
           <a:xfrm>
-            <a:off x="1143000" y="685800"/>
-            <a:ext cx="4571640" cy="3428640"/>
-          </a:xfrm>
-          <a:prstGeom prst="rect">
-            <a:avLst/>
-          </a:prstGeom>
-          <a:ln w="0">
-            <a:noFill/>
-          </a:ln>
-        </p:spPr>
-      </p:sp>
-      <p:sp>
-        <p:nvSpPr>
-          <p:cNvPr id="109" name="PlaceHolder 2"/>
-          <p:cNvSpPr>
-            <a:spLocks noGrp="1"/>
-          </p:cNvSpPr>
-          <p:nvPr>
-            <p:ph type="body"/>
-          </p:nvPr>
-        </p:nvSpPr>
-        <p:spPr>
-          <a:xfrm>
-            <a:off x="685800" y="4343400"/>
-            <a:ext cx="5486040" cy="4114440"/>
-          </a:xfrm>
-          <a:prstGeom prst="rect">
-            <a:avLst/>
-          </a:prstGeom>
-          <a:noFill/>
-          <a:ln w="0">
-            <a:noFill/>
-          </a:ln>
-        </p:spPr>
-        <p:txBody>
-          <a:bodyPr anchor="t">
-            <a:noAutofit/>
-          </a:bodyPr>
-          <a:lstStyle/>
-          <a:p>
-            <a:endParaRPr lang="en-US" sz="2000" b="0" strike="noStrike" spc="-1">
-              <a:latin typeface="Arial"/>
-            </a:endParaRPr>
-          </a:p>
-        </p:txBody>
-      </p:sp>
-      <p:sp>
-        <p:nvSpPr>
-          <p:cNvPr id="110" name="PlaceHolder 3"/>
+            <a:off x="1108075" y="812800"/>
+            <a:ext cx="5343525" cy="4008438"/>
+          </a:xfrm>
+        </p:spPr>
+      </p:sp>
+      <p:sp>
+        <p:nvSpPr>
+          <p:cNvPr id="3" name="Notes Placeholder 2"/>
+          <p:cNvSpPr>
+            <a:spLocks noGrp="1"/>
+          </p:cNvSpPr>
+          <p:nvPr>
+            <p:ph type="body" idx="1"/>
+          </p:nvPr>
+        </p:nvSpPr>
+        <p:spPr/>
+        <p:txBody>
+          <a:bodyPr/>
+          <a:lstStyle/>
+          <a:p>
+            <a:r>
+              <a:rPr lang="en-US" dirty="0"/>
+              <a:t>Hello and welcome to an update on our RBE550 project for Autonomous operations for last mile delivery on an urban sidewalk</a:t>
+            </a:r>
+          </a:p>
+        </p:txBody>
+      </p:sp>
+      <p:sp>
+        <p:nvSpPr>
+          <p:cNvPr id="4" name="Slide Number Placeholder 3"/>
           <p:cNvSpPr>
             <a:spLocks noGrp="1"/>
           </p:cNvSpPr>
@@ -562,43 +543,30 @@
             <p:ph type="sldNum"/>
           </p:nvPr>
         </p:nvSpPr>
-        <p:spPr>
-          <a:xfrm>
-            <a:off x="3884760" y="8685360"/>
-            <a:ext cx="2971440" cy="456840"/>
-          </a:xfrm>
-          <a:prstGeom prst="rect">
-            <a:avLst/>
-          </a:prstGeom>
-          <a:noFill/>
-          <a:ln w="0">
-            <a:noFill/>
-          </a:ln>
-        </p:spPr>
-        <p:txBody>
-          <a:bodyPr anchor="b">
-            <a:noAutofit/>
-          </a:bodyPr>
-          <a:lstStyle/>
-          <a:p>
-            <a:pPr algn="r">
-              <a:lnSpc>
-                <a:spcPct val="100000"/>
-              </a:lnSpc>
-            </a:pPr>
-            <a:fld id="{D890A5A8-5D6F-49CC-B0C9-36D1840D4B80}" type="slidenum">
-              <a:rPr lang="en-US" sz="1200" b="0" strike="noStrike" spc="-1">
+        <p:spPr/>
+        <p:txBody>
+          <a:bodyPr/>
+          <a:lstStyle/>
+          <a:p>
+            <a:pPr algn="r"/>
+            <a:fld id="{487CCBDF-53D7-403E-9B6C-E87EB08C71D0}" type="slidenum">
+              <a:rPr lang="en-US" sz="1400" b="0" strike="noStrike" spc="-1" smtClean="0">
                 <a:latin typeface="Times New Roman"/>
               </a:rPr>
-              <a:t>2</a:t>
+              <a:t>1</a:t>
             </a:fld>
-            <a:endParaRPr lang="en-US" sz="1200" b="0" strike="noStrike" spc="-1">
+            <a:endParaRPr lang="en-US" sz="1400" b="0" strike="noStrike" spc="-1">
               <a:latin typeface="Times New Roman"/>
             </a:endParaRPr>
           </a:p>
         </p:txBody>
       </p:sp>
     </p:spTree>
+    <p:extLst>
+      <p:ext uri="{BB962C8B-B14F-4D97-AF65-F5344CB8AC3E}">
+        <p14:creationId xmlns:p14="http://schemas.microsoft.com/office/powerpoint/2010/main" val="715688676"/>
+      </p:ext>
+    </p:extLst>
   </p:cSld>
   <p:clrMapOvr>
     <a:masterClrMapping/>
@@ -625,7 +593,7 @@
       </p:grpSpPr>
       <p:sp>
         <p:nvSpPr>
-          <p:cNvPr id="111" name="PlaceHolder 1"/>
+          <p:cNvPr id="108" name="PlaceHolder 1"/>
           <p:cNvSpPr>
             <a:spLocks noGrp="1" noRot="1" noChangeAspect="1"/>
           </p:cNvSpPr>
@@ -636,19 +604,19 @@
         <p:spPr>
           <a:xfrm>
             <a:off x="1143000" y="685800"/>
-            <a:ext cx="4571640" cy="3428640"/>
-          </a:xfrm>
-          <a:prstGeom prst="rect">
-            <a:avLst/>
-          </a:prstGeom>
-          <a:ln w="0">
-            <a:noFill/>
-          </a:ln>
-        </p:spPr>
-      </p:sp>
-      <p:sp>
-        <p:nvSpPr>
-          <p:cNvPr id="112" name="PlaceHolder 2"/>
+            <a:ext cx="4572000" cy="3429000"/>
+          </a:xfrm>
+          <a:prstGeom prst="rect">
+            <a:avLst/>
+          </a:prstGeom>
+          <a:ln w="0">
+            <a:noFill/>
+          </a:ln>
+        </p:spPr>
+      </p:sp>
+      <p:sp>
+        <p:nvSpPr>
+          <p:cNvPr id="109" name="PlaceHolder 2"/>
           <p:cNvSpPr>
             <a:spLocks noGrp="1"/>
           </p:cNvSpPr>
@@ -675,9 +643,241 @@
           </a:bodyPr>
           <a:lstStyle/>
           <a:p>
-            <a:endParaRPr lang="en-US" sz="2000" b="0" strike="noStrike" spc="-1">
-              <a:latin typeface="Arial"/>
-            </a:endParaRPr>
+            <a:r>
+              <a:rPr lang="en-US" sz="2000" b="0" strike="noStrike" spc="-1" dirty="0">
+                <a:latin typeface="Arial"/>
+              </a:rPr>
+              <a:t>We continue to believe that the economic and environmental fundamentals continue to grow to drive growth in last mile delivery.  Despite pandemic population declines in many urban areas, the sheer density of people makes this setting relevant for last mile delivery.</a:t>
+            </a:r>
+          </a:p>
+        </p:txBody>
+      </p:sp>
+      <p:sp>
+        <p:nvSpPr>
+          <p:cNvPr id="110" name="PlaceHolder 3"/>
+          <p:cNvSpPr>
+            <a:spLocks noGrp="1"/>
+          </p:cNvSpPr>
+          <p:nvPr>
+            <p:ph type="sldNum"/>
+          </p:nvPr>
+        </p:nvSpPr>
+        <p:spPr>
+          <a:xfrm>
+            <a:off x="3884760" y="8685360"/>
+            <a:ext cx="2971440" cy="456840"/>
+          </a:xfrm>
+          <a:prstGeom prst="rect">
+            <a:avLst/>
+          </a:prstGeom>
+          <a:noFill/>
+          <a:ln w="0">
+            <a:noFill/>
+          </a:ln>
+        </p:spPr>
+        <p:txBody>
+          <a:bodyPr anchor="b">
+            <a:noAutofit/>
+          </a:bodyPr>
+          <a:lstStyle/>
+          <a:p>
+            <a:pPr algn="r">
+              <a:lnSpc>
+                <a:spcPct val="100000"/>
+              </a:lnSpc>
+            </a:pPr>
+            <a:fld id="{D890A5A8-5D6F-49CC-B0C9-36D1840D4B80}" type="slidenum">
+              <a:rPr lang="en-US" sz="1200" b="0" strike="noStrike" spc="-1">
+                <a:latin typeface="Times New Roman"/>
+              </a:rPr>
+              <a:t>2</a:t>
+            </a:fld>
+            <a:endParaRPr lang="en-US" sz="1200" b="0" strike="noStrike" spc="-1">
+              <a:latin typeface="Times New Roman"/>
+            </a:endParaRPr>
+          </a:p>
+        </p:txBody>
+      </p:sp>
+    </p:spTree>
+  </p:cSld>
+  <p:clrMapOvr>
+    <a:masterClrMapping/>
+  </p:clrMapOvr>
+</p:notes>
+</file>
+
+<file path=ppt/notesSlides/notesSlide3.xml><?xml version="1.0" encoding="utf-8"?>
+<p:notes xmlns:a="http://schemas.openxmlformats.org/drawingml/2006/main" xmlns:r="http://schemas.openxmlformats.org/officeDocument/2006/relationships" xmlns:p="http://schemas.openxmlformats.org/presentationml/2006/main">
+  <p:cSld>
+    <p:spTree>
+      <p:nvGrpSpPr>
+        <p:cNvPr id="1" name=""/>
+        <p:cNvGrpSpPr/>
+        <p:nvPr/>
+      </p:nvGrpSpPr>
+      <p:grpSpPr>
+        <a:xfrm>
+          <a:off x="0" y="0"/>
+          <a:ext cx="0" cy="0"/>
+          <a:chOff x="0" y="0"/>
+          <a:chExt cx="0" cy="0"/>
+        </a:xfrm>
+      </p:grpSpPr>
+      <p:sp>
+        <p:nvSpPr>
+          <p:cNvPr id="2" name="Slide Image Placeholder 1"/>
+          <p:cNvSpPr>
+            <a:spLocks noGrp="1" noRot="1" noChangeAspect="1"/>
+          </p:cNvSpPr>
+          <p:nvPr>
+            <p:ph type="sldImg"/>
+          </p:nvPr>
+        </p:nvSpPr>
+        <p:spPr>
+          <a:xfrm>
+            <a:off x="1108075" y="812800"/>
+            <a:ext cx="5343525" cy="4008438"/>
+          </a:xfrm>
+        </p:spPr>
+      </p:sp>
+      <p:sp>
+        <p:nvSpPr>
+          <p:cNvPr id="3" name="Notes Placeholder 2"/>
+          <p:cNvSpPr>
+            <a:spLocks noGrp="1"/>
+          </p:cNvSpPr>
+          <p:nvPr>
+            <p:ph type="body" idx="1"/>
+          </p:nvPr>
+        </p:nvSpPr>
+        <p:spPr/>
+        <p:txBody>
+          <a:bodyPr/>
+          <a:lstStyle/>
+          <a:p>
+            <a:r>
+              <a:rPr lang="en-US" dirty="0"/>
+              <a:t>AS noted in the previous proposal, we have proposed to design and simulate autonomous navigation along an urban sidewalk for last mile delivery of items like groceries.  We to follow sidewalk rules, staying on the sidewalk, crossing at crosswalks and not veering into the street..  We are planning for both the common static obstacles one might encounter such as dumpsters, construction cones and cardboard boxes as well as dynamic obstacles such as other delivery bots or people.</a:t>
+            </a:r>
+          </a:p>
+        </p:txBody>
+      </p:sp>
+      <p:sp>
+        <p:nvSpPr>
+          <p:cNvPr id="4" name="Slide Number Placeholder 3"/>
+          <p:cNvSpPr>
+            <a:spLocks noGrp="1"/>
+          </p:cNvSpPr>
+          <p:nvPr>
+            <p:ph type="sldNum"/>
+          </p:nvPr>
+        </p:nvSpPr>
+        <p:spPr/>
+        <p:txBody>
+          <a:bodyPr/>
+          <a:lstStyle/>
+          <a:p>
+            <a:pPr algn="r"/>
+            <a:fld id="{487CCBDF-53D7-403E-9B6C-E87EB08C71D0}" type="slidenum">
+              <a:rPr lang="en-US" sz="1400" b="0" strike="noStrike" spc="-1" smtClean="0">
+                <a:latin typeface="Times New Roman"/>
+              </a:rPr>
+              <a:t>3</a:t>
+            </a:fld>
+            <a:endParaRPr lang="en-US" sz="1400" b="0" strike="noStrike" spc="-1">
+              <a:latin typeface="Times New Roman"/>
+            </a:endParaRPr>
+          </a:p>
+        </p:txBody>
+      </p:sp>
+    </p:spTree>
+    <p:extLst>
+      <p:ext uri="{BB962C8B-B14F-4D97-AF65-F5344CB8AC3E}">
+        <p14:creationId xmlns:p14="http://schemas.microsoft.com/office/powerpoint/2010/main" val="3952455279"/>
+      </p:ext>
+    </p:extLst>
+  </p:cSld>
+  <p:clrMapOvr>
+    <a:masterClrMapping/>
+  </p:clrMapOvr>
+</p:notes>
+</file>
+
+<file path=ppt/notesSlides/notesSlide4.xml><?xml version="1.0" encoding="utf-8"?>
+<p:notes xmlns:a="http://schemas.openxmlformats.org/drawingml/2006/main" xmlns:r="http://schemas.openxmlformats.org/officeDocument/2006/relationships" xmlns:p="http://schemas.openxmlformats.org/presentationml/2006/main">
+  <p:cSld>
+    <p:spTree>
+      <p:nvGrpSpPr>
+        <p:cNvPr id="1" name=""/>
+        <p:cNvGrpSpPr/>
+        <p:nvPr/>
+      </p:nvGrpSpPr>
+      <p:grpSpPr>
+        <a:xfrm>
+          <a:off x="0" y="0"/>
+          <a:ext cx="0" cy="0"/>
+          <a:chOff x="0" y="0"/>
+          <a:chExt cx="0" cy="0"/>
+        </a:xfrm>
+      </p:grpSpPr>
+      <p:sp>
+        <p:nvSpPr>
+          <p:cNvPr id="111" name="PlaceHolder 1"/>
+          <p:cNvSpPr>
+            <a:spLocks noGrp="1" noRot="1" noChangeAspect="1"/>
+          </p:cNvSpPr>
+          <p:nvPr>
+            <p:ph type="sldImg"/>
+          </p:nvPr>
+        </p:nvSpPr>
+        <p:spPr>
+          <a:xfrm>
+            <a:off x="1143000" y="685800"/>
+            <a:ext cx="4572000" cy="3429000"/>
+          </a:xfrm>
+          <a:prstGeom prst="rect">
+            <a:avLst/>
+          </a:prstGeom>
+          <a:ln w="0">
+            <a:noFill/>
+          </a:ln>
+        </p:spPr>
+      </p:sp>
+      <p:sp>
+        <p:nvSpPr>
+          <p:cNvPr id="112" name="PlaceHolder 2"/>
+          <p:cNvSpPr>
+            <a:spLocks noGrp="1"/>
+          </p:cNvSpPr>
+          <p:nvPr>
+            <p:ph type="body"/>
+          </p:nvPr>
+        </p:nvSpPr>
+        <p:spPr>
+          <a:xfrm>
+            <a:off x="685800" y="4343400"/>
+            <a:ext cx="5486040" cy="4114440"/>
+          </a:xfrm>
+          <a:prstGeom prst="rect">
+            <a:avLst/>
+          </a:prstGeom>
+          <a:noFill/>
+          <a:ln w="0">
+            <a:noFill/>
+          </a:ln>
+        </p:spPr>
+        <p:txBody>
+          <a:bodyPr anchor="t">
+            <a:noAutofit/>
+          </a:bodyPr>
+          <a:lstStyle/>
+          <a:p>
+            <a:r>
+              <a:rPr lang="en-US" sz="2000" b="0" strike="noStrike" spc="-1" dirty="0">
+                <a:latin typeface="Arial"/>
+              </a:rPr>
+              <a:t>We plan to execute the modelling and simulation in ROS and visualize in Gazebo.</a:t>
+            </a:r>
           </a:p>
         </p:txBody>
       </p:sp>
@@ -728,6 +928,438 @@
         </p:txBody>
       </p:sp>
     </p:spTree>
+  </p:cSld>
+  <p:clrMapOvr>
+    <a:masterClrMapping/>
+  </p:clrMapOvr>
+</p:notes>
+</file>
+
+<file path=ppt/notesSlides/notesSlide5.xml><?xml version="1.0" encoding="utf-8"?>
+<p:notes xmlns:a="http://schemas.openxmlformats.org/drawingml/2006/main" xmlns:r="http://schemas.openxmlformats.org/officeDocument/2006/relationships" xmlns:p="http://schemas.openxmlformats.org/presentationml/2006/main">
+  <p:cSld>
+    <p:spTree>
+      <p:nvGrpSpPr>
+        <p:cNvPr id="1" name=""/>
+        <p:cNvGrpSpPr/>
+        <p:nvPr/>
+      </p:nvGrpSpPr>
+      <p:grpSpPr>
+        <a:xfrm>
+          <a:off x="0" y="0"/>
+          <a:ext cx="0" cy="0"/>
+          <a:chOff x="0" y="0"/>
+          <a:chExt cx="0" cy="0"/>
+        </a:xfrm>
+      </p:grpSpPr>
+      <p:sp>
+        <p:nvSpPr>
+          <p:cNvPr id="2" name="Slide Image Placeholder 1"/>
+          <p:cNvSpPr>
+            <a:spLocks noGrp="1" noRot="1" noChangeAspect="1"/>
+          </p:cNvSpPr>
+          <p:nvPr>
+            <p:ph type="sldImg"/>
+          </p:nvPr>
+        </p:nvSpPr>
+        <p:spPr>
+          <a:xfrm>
+            <a:off x="1108075" y="812800"/>
+            <a:ext cx="5343525" cy="4008438"/>
+          </a:xfrm>
+        </p:spPr>
+      </p:sp>
+      <p:sp>
+        <p:nvSpPr>
+          <p:cNvPr id="3" name="Notes Placeholder 2"/>
+          <p:cNvSpPr>
+            <a:spLocks noGrp="1"/>
+          </p:cNvSpPr>
+          <p:nvPr>
+            <p:ph type="body" idx="1"/>
+          </p:nvPr>
+        </p:nvSpPr>
+        <p:spPr/>
+        <p:txBody>
+          <a:bodyPr/>
+          <a:lstStyle/>
+          <a:p>
+            <a:pPr marL="0" marR="0" lvl="0" indent="0" algn="l" defTabSz="914400" rtl="0" eaLnBrk="1" fontAlgn="auto" latinLnBrk="0" hangingPunct="1">
+              <a:lnSpc>
+                <a:spcPct val="100000"/>
+              </a:lnSpc>
+              <a:spcBef>
+                <a:spcPts val="0"/>
+              </a:spcBef>
+              <a:spcAft>
+                <a:spcPts val="0"/>
+              </a:spcAft>
+              <a:buClrTx/>
+              <a:buSzTx/>
+              <a:buFontTx/>
+              <a:buNone/>
+              <a:tabLst/>
+              <a:defRPr/>
+            </a:pPr>
+            <a:r>
+              <a:rPr lang="en-US" dirty="0"/>
+              <a:t>We continue to be on our planned schedule.  Because of the newness of the tools to both of us, we have spent the past 3 weeks studying both ROS and Gazebo as well as setting up the programming environment. </a:t>
+            </a:r>
+            <a:r>
+              <a:rPr lang="en-US" sz="1200" kern="1200" dirty="0">
+                <a:solidFill>
+                  <a:schemeClr val="tx1"/>
+                </a:solidFill>
+                <a:effectLst/>
+                <a:latin typeface="+mn-lt"/>
+                <a:ea typeface="+mn-ea"/>
+                <a:cs typeface="+mn-cs"/>
+              </a:rPr>
+              <a:t>During this time we also explored the use of Docker as a development tool. We began by referencing wikis maintained by the ROS organization to get our initial images configured and followed that with reading several blogs and sources attempting to find a balance of ease of approach with industry best practices.  Keith later posted a detailed document for others outlining this in the discussion forum.</a:t>
+            </a:r>
+          </a:p>
+          <a:p>
+            <a:pPr marL="0" marR="0" lvl="0" indent="0" algn="l" defTabSz="914400" rtl="0" eaLnBrk="1" fontAlgn="auto" latinLnBrk="0" hangingPunct="1">
+              <a:lnSpc>
+                <a:spcPct val="100000"/>
+              </a:lnSpc>
+              <a:spcBef>
+                <a:spcPts val="0"/>
+              </a:spcBef>
+              <a:spcAft>
+                <a:spcPts val="0"/>
+              </a:spcAft>
+              <a:buClrTx/>
+              <a:buSzTx/>
+              <a:buFontTx/>
+              <a:buNone/>
+              <a:tabLst/>
+              <a:defRPr/>
+            </a:pPr>
+            <a:endParaRPr lang="en-US" sz="1200" kern="1200" dirty="0">
+              <a:solidFill>
+                <a:schemeClr val="tx1"/>
+              </a:solidFill>
+              <a:effectLst/>
+              <a:latin typeface="+mn-lt"/>
+              <a:ea typeface="+mn-ea"/>
+              <a:cs typeface="+mn-cs"/>
+            </a:endParaRPr>
+          </a:p>
+          <a:p>
+            <a:pPr marL="0" marR="0" lvl="0" indent="0" algn="l" defTabSz="914400" rtl="0" eaLnBrk="1" fontAlgn="auto" latinLnBrk="0" hangingPunct="1">
+              <a:lnSpc>
+                <a:spcPct val="100000"/>
+              </a:lnSpc>
+              <a:spcBef>
+                <a:spcPts val="0"/>
+              </a:spcBef>
+              <a:spcAft>
+                <a:spcPts val="0"/>
+              </a:spcAft>
+              <a:buClrTx/>
+              <a:buSzTx/>
+              <a:buFontTx/>
+              <a:buNone/>
+              <a:tabLst/>
+              <a:defRPr/>
+            </a:pPr>
+            <a:r>
+              <a:rPr lang="en-US" sz="1200" kern="1200" dirty="0">
+                <a:solidFill>
+                  <a:schemeClr val="tx1"/>
+                </a:solidFill>
+                <a:effectLst/>
+                <a:latin typeface="+mn-lt"/>
+                <a:ea typeface="+mn-ea"/>
+                <a:cs typeface="+mn-cs"/>
+              </a:rPr>
+              <a:t>As part of the learning, Keith has also been working hard at learning the internals of the ROS Navigation Stack, URDF/XARCO modeling for Gazebo, and Gazebo world creation.</a:t>
+            </a:r>
+          </a:p>
+          <a:p>
+            <a:pPr marL="0" marR="0" lvl="0" indent="0" algn="l" defTabSz="914400" rtl="0" eaLnBrk="1" fontAlgn="auto" latinLnBrk="0" hangingPunct="1">
+              <a:lnSpc>
+                <a:spcPct val="100000"/>
+              </a:lnSpc>
+              <a:spcBef>
+                <a:spcPts val="0"/>
+              </a:spcBef>
+              <a:spcAft>
+                <a:spcPts val="0"/>
+              </a:spcAft>
+              <a:buClrTx/>
+              <a:buSzTx/>
+              <a:buFontTx/>
+              <a:buNone/>
+              <a:tabLst/>
+              <a:defRPr/>
+            </a:pPr>
+            <a:endParaRPr lang="en-US" sz="1200" kern="1200" dirty="0">
+              <a:solidFill>
+                <a:schemeClr val="tx1"/>
+              </a:solidFill>
+              <a:effectLst/>
+              <a:latin typeface="+mn-lt"/>
+              <a:ea typeface="+mn-ea"/>
+              <a:cs typeface="+mn-cs"/>
+            </a:endParaRPr>
+          </a:p>
+          <a:p>
+            <a:pPr marL="0" marR="0" lvl="0" indent="0" algn="l" defTabSz="914400" rtl="0" eaLnBrk="1" fontAlgn="auto" latinLnBrk="0" hangingPunct="1">
+              <a:lnSpc>
+                <a:spcPct val="100000"/>
+              </a:lnSpc>
+              <a:spcBef>
+                <a:spcPts val="0"/>
+              </a:spcBef>
+              <a:spcAft>
+                <a:spcPts val="0"/>
+              </a:spcAft>
+              <a:buClrTx/>
+              <a:buSzTx/>
+              <a:buFontTx/>
+              <a:buNone/>
+              <a:tabLst/>
+              <a:defRPr/>
+            </a:pPr>
+            <a:endParaRPr lang="en-US" sz="1200" kern="1200" dirty="0">
+              <a:solidFill>
+                <a:schemeClr val="tx1"/>
+              </a:solidFill>
+              <a:effectLst/>
+              <a:latin typeface="+mn-lt"/>
+              <a:ea typeface="+mn-ea"/>
+              <a:cs typeface="+mn-cs"/>
+            </a:endParaRPr>
+          </a:p>
+          <a:p>
+            <a:endParaRPr lang="en-US" dirty="0"/>
+          </a:p>
+        </p:txBody>
+      </p:sp>
+      <p:sp>
+        <p:nvSpPr>
+          <p:cNvPr id="4" name="Slide Number Placeholder 3"/>
+          <p:cNvSpPr>
+            <a:spLocks noGrp="1"/>
+          </p:cNvSpPr>
+          <p:nvPr>
+            <p:ph type="sldNum"/>
+          </p:nvPr>
+        </p:nvSpPr>
+        <p:spPr/>
+        <p:txBody>
+          <a:bodyPr/>
+          <a:lstStyle/>
+          <a:p>
+            <a:pPr algn="r"/>
+            <a:fld id="{487CCBDF-53D7-403E-9B6C-E87EB08C71D0}" type="slidenum">
+              <a:rPr lang="en-US" sz="1400" b="0" strike="noStrike" spc="-1" smtClean="0">
+                <a:latin typeface="Times New Roman"/>
+              </a:rPr>
+              <a:t>5</a:t>
+            </a:fld>
+            <a:endParaRPr lang="en-US" sz="1400" b="0" strike="noStrike" spc="-1">
+              <a:latin typeface="Times New Roman"/>
+            </a:endParaRPr>
+          </a:p>
+        </p:txBody>
+      </p:sp>
+    </p:spTree>
+    <p:extLst>
+      <p:ext uri="{BB962C8B-B14F-4D97-AF65-F5344CB8AC3E}">
+        <p14:creationId xmlns:p14="http://schemas.microsoft.com/office/powerpoint/2010/main" val="2166599242"/>
+      </p:ext>
+    </p:extLst>
+  </p:cSld>
+  <p:clrMapOvr>
+    <a:masterClrMapping/>
+  </p:clrMapOvr>
+</p:notes>
+</file>
+
+<file path=ppt/notesSlides/notesSlide6.xml><?xml version="1.0" encoding="utf-8"?>
+<p:notes xmlns:a="http://schemas.openxmlformats.org/drawingml/2006/main" xmlns:r="http://schemas.openxmlformats.org/officeDocument/2006/relationships" xmlns:p="http://schemas.openxmlformats.org/presentationml/2006/main">
+  <p:cSld>
+    <p:spTree>
+      <p:nvGrpSpPr>
+        <p:cNvPr id="1" name=""/>
+        <p:cNvGrpSpPr/>
+        <p:nvPr/>
+      </p:nvGrpSpPr>
+      <p:grpSpPr>
+        <a:xfrm>
+          <a:off x="0" y="0"/>
+          <a:ext cx="0" cy="0"/>
+          <a:chOff x="0" y="0"/>
+          <a:chExt cx="0" cy="0"/>
+        </a:xfrm>
+      </p:grpSpPr>
+      <p:sp>
+        <p:nvSpPr>
+          <p:cNvPr id="2" name="Slide Image Placeholder 1"/>
+          <p:cNvSpPr>
+            <a:spLocks noGrp="1" noRot="1" noChangeAspect="1"/>
+          </p:cNvSpPr>
+          <p:nvPr>
+            <p:ph type="sldImg"/>
+          </p:nvPr>
+        </p:nvSpPr>
+        <p:spPr>
+          <a:xfrm>
+            <a:off x="1108075" y="812800"/>
+            <a:ext cx="5343525" cy="4008438"/>
+          </a:xfrm>
+        </p:spPr>
+      </p:sp>
+      <p:sp>
+        <p:nvSpPr>
+          <p:cNvPr id="3" name="Notes Placeholder 2"/>
+          <p:cNvSpPr>
+            <a:spLocks noGrp="1"/>
+          </p:cNvSpPr>
+          <p:nvPr>
+            <p:ph type="body" idx="1"/>
+          </p:nvPr>
+        </p:nvSpPr>
+        <p:spPr/>
+        <p:txBody>
+          <a:bodyPr/>
+          <a:lstStyle/>
+          <a:p>
+            <a:pPr marL="0" marR="0" lvl="0" indent="0" algn="l" defTabSz="914400" rtl="0" eaLnBrk="1" fontAlgn="auto" latinLnBrk="0" hangingPunct="1">
+              <a:lnSpc>
+                <a:spcPct val="100000"/>
+              </a:lnSpc>
+              <a:spcBef>
+                <a:spcPts val="0"/>
+              </a:spcBef>
+              <a:spcAft>
+                <a:spcPts val="0"/>
+              </a:spcAft>
+              <a:buClrTx/>
+              <a:buSzTx/>
+              <a:buFontTx/>
+              <a:buNone/>
+              <a:tabLst/>
+              <a:defRPr/>
+            </a:pPr>
+            <a:r>
+              <a:rPr lang="en-US" dirty="0"/>
+              <a:t>In the coming week we’ll be developing the world environment for the simulations as well as the URDF for the robot.  We’ve selected a 4-wheeled non-holonomic Ackerman steering vehicle for the implementation.</a:t>
+            </a:r>
+            <a:r>
+              <a:rPr lang="en-US" sz="1200" kern="1200" dirty="0">
+                <a:solidFill>
+                  <a:schemeClr val="tx1"/>
+                </a:solidFill>
+                <a:effectLst/>
+                <a:latin typeface="+mn-lt"/>
+                <a:ea typeface="+mn-ea"/>
+                <a:cs typeface="+mn-cs"/>
+              </a:rPr>
+              <a:t> It will utilize a GPS sensor for a pre-determined, global path plan and LIDAR for more specific localized obstacle avoidance during operation. Other sensors (such as a camera) may be included on the robot to match capabilities seen in current delivery robots, but we will likely depend on LIDAR for mapping. We will assume that the odometry measurements in the robot are without noise as we are experimenting with path planning and not sensor fusion or localization techniques.</a:t>
+            </a:r>
+          </a:p>
+          <a:p>
+            <a:pPr marL="0" marR="0" lvl="0" indent="0" algn="l" defTabSz="914400" rtl="0" eaLnBrk="1" fontAlgn="auto" latinLnBrk="0" hangingPunct="1">
+              <a:lnSpc>
+                <a:spcPct val="100000"/>
+              </a:lnSpc>
+              <a:spcBef>
+                <a:spcPts val="0"/>
+              </a:spcBef>
+              <a:spcAft>
+                <a:spcPts val="0"/>
+              </a:spcAft>
+              <a:buClrTx/>
+              <a:buSzTx/>
+              <a:buFontTx/>
+              <a:buNone/>
+              <a:tabLst/>
+              <a:defRPr/>
+            </a:pPr>
+            <a:endParaRPr lang="en-US" sz="1200" kern="1200" dirty="0">
+              <a:solidFill>
+                <a:schemeClr val="tx1"/>
+              </a:solidFill>
+              <a:effectLst/>
+              <a:latin typeface="+mn-lt"/>
+              <a:ea typeface="+mn-ea"/>
+              <a:cs typeface="+mn-cs"/>
+            </a:endParaRPr>
+          </a:p>
+          <a:p>
+            <a:pPr marL="0" marR="0" lvl="0" indent="0" algn="l" defTabSz="914400" rtl="0" eaLnBrk="1" fontAlgn="auto" latinLnBrk="0" hangingPunct="1">
+              <a:lnSpc>
+                <a:spcPct val="100000"/>
+              </a:lnSpc>
+              <a:spcBef>
+                <a:spcPts val="0"/>
+              </a:spcBef>
+              <a:spcAft>
+                <a:spcPts val="0"/>
+              </a:spcAft>
+              <a:buClrTx/>
+              <a:buSzTx/>
+              <a:buFontTx/>
+              <a:buNone/>
+              <a:tabLst/>
+              <a:defRPr/>
+            </a:pPr>
+            <a:r>
+              <a:rPr lang="en-US" sz="1200" kern="1200" dirty="0">
+                <a:solidFill>
+                  <a:schemeClr val="tx1"/>
+                </a:solidFill>
+                <a:effectLst/>
+                <a:latin typeface="+mn-lt"/>
+                <a:ea typeface="+mn-ea"/>
+                <a:cs typeface="+mn-cs"/>
+              </a:rPr>
+              <a:t>WE look forward to your comments and feedback.</a:t>
+            </a:r>
+          </a:p>
+          <a:p>
+            <a:endParaRPr lang="en-US" dirty="0"/>
+          </a:p>
+        </p:txBody>
+      </p:sp>
+      <p:sp>
+        <p:nvSpPr>
+          <p:cNvPr id="4" name="Slide Number Placeholder 3"/>
+          <p:cNvSpPr>
+            <a:spLocks noGrp="1"/>
+          </p:cNvSpPr>
+          <p:nvPr>
+            <p:ph type="sldNum"/>
+          </p:nvPr>
+        </p:nvSpPr>
+        <p:spPr/>
+        <p:txBody>
+          <a:bodyPr/>
+          <a:lstStyle/>
+          <a:p>
+            <a:pPr algn="r"/>
+            <a:fld id="{487CCBDF-53D7-403E-9B6C-E87EB08C71D0}" type="slidenum">
+              <a:rPr lang="en-US" sz="1400" b="0" strike="noStrike" spc="-1" smtClean="0">
+                <a:latin typeface="Times New Roman"/>
+              </a:rPr>
+              <a:t>6</a:t>
+            </a:fld>
+            <a:endParaRPr lang="en-US" sz="1400" b="0" strike="noStrike" spc="-1">
+              <a:latin typeface="Times New Roman"/>
+            </a:endParaRPr>
+          </a:p>
+        </p:txBody>
+      </p:sp>
+    </p:spTree>
+    <p:extLst>
+      <p:ext uri="{BB962C8B-B14F-4D97-AF65-F5344CB8AC3E}">
+        <p14:creationId xmlns:p14="http://schemas.microsoft.com/office/powerpoint/2010/main" val="1677348217"/>
+      </p:ext>
+    </p:extLst>
   </p:cSld>
   <p:clrMapOvr>
     <a:masterClrMapping/>
@@ -7042,7 +7674,7 @@
           <p:nvPr/>
         </p:nvPicPr>
         <p:blipFill>
-          <a:blip r:embed="rId2"/>
+          <a:blip r:embed="rId3"/>
           <a:stretch>
             <a:fillRect/>
           </a:stretch>
@@ -7119,51 +7751,6 @@
           </a:p>
         </p:txBody>
       </p:sp>
-      <p:pic>
-        <p:nvPicPr>
-          <p:cNvPr id="6" name="Picture 5">
-            <a:extLst>
-              <a:ext uri="{FF2B5EF4-FFF2-40B4-BE49-F238E27FC236}">
-                <a16:creationId xmlns:a16="http://schemas.microsoft.com/office/drawing/2014/main" id="{36FE8137-A796-E949-B954-C6A27433E9EC}"/>
-              </a:ext>
-            </a:extLst>
-          </p:cNvPr>
-          <p:cNvPicPr>
-            <a:picLocks noChangeAspect="1"/>
-          </p:cNvPicPr>
-          <p:nvPr/>
-        </p:nvPicPr>
-        <p:blipFill>
-          <a:blip r:embed="rId2">
-            <a:extLst>
-              <a:ext uri="{BEBA8EAE-BF5A-486C-A8C5-ECC9F3942E4B}">
-                <a14:imgProps xmlns:a14="http://schemas.microsoft.com/office/drawing/2010/main">
-                  <a14:imgLayer>
-                    <a14:imgEffect>
-                      <a14:artisticPencilGrayscale trans="4000" pencilSize="9"/>
-                    </a14:imgEffect>
-                  </a14:imgLayer>
-                </a14:imgProps>
-              </a:ext>
-            </a:extLst>
-          </a:blip>
-          <a:stretch>
-            <a:fillRect/>
-          </a:stretch>
-        </p:blipFill>
-        <p:spPr>
-          <a:xfrm>
-            <a:off x="6127528" y="2255520"/>
-            <a:ext cx="2776260" cy="2794000"/>
-          </a:xfrm>
-          <a:prstGeom prst="rect">
-            <a:avLst/>
-          </a:prstGeom>
-          <a:effectLst>
-            <a:softEdge rad="88900"/>
-          </a:effectLst>
-        </p:spPr>
-      </p:pic>
       <p:sp>
         <p:nvSpPr>
           <p:cNvPr id="2" name="TextBox 1">
@@ -7179,7 +7766,7 @@
         <p:spPr>
           <a:xfrm>
             <a:off x="548640" y="1836333"/>
-            <a:ext cx="5293360" cy="3551742"/>
+            <a:ext cx="5466080" cy="3213187"/>
           </a:xfrm>
           <a:prstGeom prst="rect">
             <a:avLst/>
@@ -7320,7 +7907,7 @@
                 <a:latin typeface="Verdana"/>
                 <a:ea typeface="Verdana"/>
               </a:rPr>
-              <a:t>() wheeled (tracked?) delivery bot </a:t>
+              <a:t>4 wheeled delivery bot/Ackerman</a:t>
             </a:r>
           </a:p>
           <a:p>
@@ -7372,6 +7959,51 @@
           </a:p>
         </p:txBody>
       </p:sp>
+      <p:pic>
+        <p:nvPicPr>
+          <p:cNvPr id="3" name="Picture 2">
+            <a:extLst>
+              <a:ext uri="{FF2B5EF4-FFF2-40B4-BE49-F238E27FC236}">
+                <a16:creationId xmlns:a16="http://schemas.microsoft.com/office/drawing/2014/main" id="{C3F85370-B0CD-124F-B966-364F2AA7E455}"/>
+              </a:ext>
+            </a:extLst>
+          </p:cNvPr>
+          <p:cNvPicPr>
+            <a:picLocks noChangeAspect="1"/>
+          </p:cNvPicPr>
+          <p:nvPr/>
+        </p:nvPicPr>
+        <p:blipFill>
+          <a:blip r:embed="rId3">
+            <a:extLst>
+              <a:ext uri="{BEBA8EAE-BF5A-486C-A8C5-ECC9F3942E4B}">
+                <a14:imgProps xmlns:a14="http://schemas.microsoft.com/office/drawing/2010/main">
+                  <a14:imgLayer>
+                    <a14:imgEffect>
+                      <a14:artisticChalkSketch/>
+                    </a14:imgEffect>
+                  </a14:imgLayer>
+                </a14:imgProps>
+              </a:ext>
+            </a:extLst>
+          </a:blip>
+          <a:stretch>
+            <a:fillRect/>
+          </a:stretch>
+        </p:blipFill>
+        <p:spPr>
+          <a:xfrm>
+            <a:off x="5712002" y="1615440"/>
+            <a:ext cx="2974438" cy="4296410"/>
+          </a:xfrm>
+          <a:prstGeom prst="rect">
+            <a:avLst/>
+          </a:prstGeom>
+          <a:effectLst>
+            <a:softEdge rad="139700"/>
+          </a:effectLst>
+        </p:spPr>
+      </p:pic>
     </p:spTree>
     <p:extLst>
       <p:ext uri="{BB962C8B-B14F-4D97-AF65-F5344CB8AC3E}">

</xml_diff>